<commit_message>
- added new Google Play Store link
</commit_message>
<xml_diff>
--- a/documentation/quickstart-digural-sense-app.pptx
+++ b/documentation/quickstart-digural-sense-app.pptx
@@ -6547,10 +6547,20 @@
             </a:r>
           </a:p>
           <a:p>
+            <a:pPr marL="0" indent="0">
+              <a:buNone/>
+            </a:pPr>
             <a:r>
               <a:rPr lang="de-DE" sz="1600" dirty="0"/>
-              <a:t>TODO LINK + QR CODE AND SCREENSHOT</a:t>
-            </a:r>
+              <a:t>      </a:t>
+            </a:r>
+            <a:r>
+              <a:rPr lang="de-DE" sz="1600" dirty="0">
+                <a:hlinkClick r:id="rId2"/>
+              </a:rPr>
+              <a:t>https://play.google.com/store/apps/details?id=de.lll.digural.senseapp</a:t>
+            </a:r>
+            <a:endParaRPr lang="de-DE" sz="1600" dirty="0"/>
           </a:p>
           <a:p>
             <a:pPr marL="0" indent="0">
@@ -6688,6 +6698,66 @@
           </a:p>
         </p:txBody>
       </p:sp>
+      <p:pic>
+        <p:nvPicPr>
+          <p:cNvPr id="6" name="Grafik 5">
+            <a:extLst>
+              <a:ext uri="{FF2B5EF4-FFF2-40B4-BE49-F238E27FC236}">
+                <a16:creationId xmlns:a16="http://schemas.microsoft.com/office/drawing/2014/main" id="{B9ABBF0F-C165-4D22-A01F-D2A2E26DF053}"/>
+              </a:ext>
+            </a:extLst>
+          </p:cNvPr>
+          <p:cNvPicPr>
+            <a:picLocks noChangeAspect="1"/>
+          </p:cNvPicPr>
+          <p:nvPr/>
+        </p:nvPicPr>
+        <p:blipFill>
+          <a:blip r:embed="rId3"/>
+          <a:stretch>
+            <a:fillRect/>
+          </a:stretch>
+        </p:blipFill>
+        <p:spPr>
+          <a:xfrm>
+            <a:off x="804842" y="3524811"/>
+            <a:ext cx="5666776" cy="2667157"/>
+          </a:xfrm>
+          <a:prstGeom prst="rect">
+            <a:avLst/>
+          </a:prstGeom>
+        </p:spPr>
+      </p:pic>
+      <p:pic>
+        <p:nvPicPr>
+          <p:cNvPr id="7" name="Grafik 6">
+            <a:extLst>
+              <a:ext uri="{FF2B5EF4-FFF2-40B4-BE49-F238E27FC236}">
+                <a16:creationId xmlns:a16="http://schemas.microsoft.com/office/drawing/2014/main" id="{8B06195F-F38E-4CED-AADE-DE3848D88706}"/>
+              </a:ext>
+            </a:extLst>
+          </p:cNvPr>
+          <p:cNvPicPr>
+            <a:picLocks noChangeAspect="1"/>
+          </p:cNvPicPr>
+          <p:nvPr/>
+        </p:nvPicPr>
+        <p:blipFill>
+          <a:blip r:embed="rId4"/>
+          <a:stretch>
+            <a:fillRect/>
+          </a:stretch>
+        </p:blipFill>
+        <p:spPr>
+          <a:xfrm>
+            <a:off x="9474113" y="3340143"/>
+            <a:ext cx="1602374" cy="1664004"/>
+          </a:xfrm>
+          <a:prstGeom prst="rect">
+            <a:avLst/>
+          </a:prstGeom>
+        </p:spPr>
+      </p:pic>
     </p:spTree>
     <p:extLst>
       <p:ext uri="{BB962C8B-B14F-4D97-AF65-F5344CB8AC3E}">

</xml_diff>